<commit_message>
edits after feedback from Raj and Silvia
</commit_message>
<xml_diff>
--- a/assets/slide-header.pptx
+++ b/assets/slide-header.pptx
@@ -265,7 +265,7 @@
       </p15:sldGuideLst>
     </p:ext>
     <p:ext uri="GoogleSlidesCustomDataVersion2">
-      <go:slidesCustomData xmlns="" xmlns:mc="http://schemas.openxmlformats.org/markup-compatibility/2006" xmlns:mv="urn:schemas-microsoft-com:mac:vml" xmlns:c="http://schemas.openxmlformats.org/drawingml/2006/chart" xmlns:dgm="http://schemas.openxmlformats.org/drawingml/2006/diagram" xmlns:o="urn:schemas-microsoft-com:office:office" xmlns:v="urn:schemas-microsoft-com:vml" xmlns:pvml="urn:schemas-microsoft-com:office:powerpoint" xmlns:com="http://schemas.openxmlformats.org/drawingml/2006/compatibility" xmlns:p14="http://schemas.microsoft.com/office/powerpoint/2010/main" xmlns:p15="http://schemas.microsoft.com/office/powerpoint/2012/main" xmlns:ahyp="http://schemas.microsoft.com/office/drawing/2018/hyperlinkcolor" xmlns:go="http://customooxmlschemas.google.com/" r:id="rId26" roundtripDataSignature="AMtx7mh3xTX80LKrPPnQbE+I3JQN7wPtLA=="/>
+      <go:slidesCustomData xmlns:go="http://customooxmlschemas.google.com/" xmlns:ahyp="http://schemas.microsoft.com/office/drawing/2018/hyperlinkcolor" xmlns:p15="http://schemas.microsoft.com/office/powerpoint/2012/main" xmlns:p14="http://schemas.microsoft.com/office/powerpoint/2010/main" xmlns:com="http://schemas.openxmlformats.org/drawingml/2006/compatibility" xmlns:pvml="urn:schemas-microsoft-com:office:powerpoint" xmlns:v="urn:schemas-microsoft-com:vml" xmlns:o="urn:schemas-microsoft-com:office:office" xmlns:dgm="http://schemas.openxmlformats.org/drawingml/2006/diagram" xmlns:c="http://schemas.openxmlformats.org/drawingml/2006/chart" xmlns:mv="urn:schemas-microsoft-com:mac:vml" xmlns:mc="http://schemas.openxmlformats.org/markup-compatibility/2006" xmlns="" r:id="rId26" roundtripDataSignature="AMtx7mh3xTX80LKrPPnQbE+I3JQN7wPtLA=="/>
     </p:ext>
   </p:extLst>
 </p:presentation>
@@ -11031,7 +11031,7 @@
         </p:blipFill>
         <p:spPr>
           <a:xfrm>
-            <a:off x="646171" y="138330"/>
+            <a:off x="646171" y="346151"/>
             <a:ext cx="691200" cy="719412"/>
           </a:xfrm>
           <a:prstGeom prst="rect">
@@ -11061,7 +11061,7 @@
         </p:blipFill>
         <p:spPr>
           <a:xfrm>
-            <a:off x="10807723" y="138330"/>
+            <a:off x="10807723" y="346151"/>
             <a:ext cx="993599" cy="719503"/>
           </a:xfrm>
           <a:prstGeom prst="rect">
@@ -11091,7 +11091,7 @@
         </p:blipFill>
         <p:spPr>
           <a:xfrm>
-            <a:off x="3293895" y="138330"/>
+            <a:off x="3293895" y="346151"/>
             <a:ext cx="1890000" cy="720369"/>
           </a:xfrm>
           <a:prstGeom prst="rect">
@@ -11121,7 +11121,7 @@
         </p:blipFill>
         <p:spPr>
           <a:xfrm>
-            <a:off x="8441572" y="138330"/>
+            <a:off x="8124349" y="346151"/>
             <a:ext cx="2214000" cy="719745"/>
           </a:xfrm>
           <a:prstGeom prst="rect">
@@ -11151,7 +11151,7 @@
         </p:blipFill>
         <p:spPr>
           <a:xfrm>
-            <a:off x="7191827" y="138330"/>
+            <a:off x="6613283" y="346151"/>
             <a:ext cx="1011600" cy="718769"/>
           </a:xfrm>
           <a:prstGeom prst="rect">
@@ -11181,7 +11181,7 @@
         </p:blipFill>
         <p:spPr>
           <a:xfrm>
-            <a:off x="1116629" y="138330"/>
+            <a:off x="1116629" y="346151"/>
             <a:ext cx="2271600" cy="720263"/>
           </a:xfrm>
           <a:prstGeom prst="rect">

</xml_diff>